<commit_message>
Update starter picture, TODOs
</commit_message>
<xml_diff>
--- a/pres/sketch-testkonzepte-starter.pptx
+++ b/pres/sketch-testkonzepte-starter.pptx
@@ -260,9 +260,9 @@
           <a:p>
             <a:fld id="{730348EE-7728-47DB-852A-8087B5026653}" type="datetimeFigureOut">
               <a:rPr lang="de-DE" smtClean="0"/>
-              <a:t>30.08.2019</a:t>
+              <a:t>18.09.2019</a:t>
             </a:fld>
-            <a:endParaRPr lang="de-DE"/>
+            <a:endParaRPr lang="de-DE" dirty="0"/>
           </a:p>
         </p:txBody>
       </p:sp>
@@ -287,7 +287,7 @@
           <a:bodyPr/>
           <a:lstStyle/>
           <a:p>
-            <a:endParaRPr lang="de-DE"/>
+            <a:endParaRPr lang="de-DE" dirty="0"/>
           </a:p>
         </p:txBody>
       </p:sp>
@@ -316,7 +316,7 @@
               <a:rPr lang="de-DE" smtClean="0"/>
               <a:t>‹Nr.›</a:t>
             </a:fld>
-            <a:endParaRPr lang="de-DE"/>
+            <a:endParaRPr lang="de-DE" dirty="0"/>
           </a:p>
         </p:txBody>
       </p:sp>
@@ -458,9 +458,9 @@
           <a:p>
             <a:fld id="{730348EE-7728-47DB-852A-8087B5026653}" type="datetimeFigureOut">
               <a:rPr lang="de-DE" smtClean="0"/>
-              <a:t>30.08.2019</a:t>
+              <a:t>18.09.2019</a:t>
             </a:fld>
-            <a:endParaRPr lang="de-DE"/>
+            <a:endParaRPr lang="de-DE" dirty="0"/>
           </a:p>
         </p:txBody>
       </p:sp>
@@ -485,7 +485,7 @@
           <a:bodyPr/>
           <a:lstStyle/>
           <a:p>
-            <a:endParaRPr lang="de-DE"/>
+            <a:endParaRPr lang="de-DE" dirty="0"/>
           </a:p>
         </p:txBody>
       </p:sp>
@@ -514,7 +514,7 @@
               <a:rPr lang="de-DE" smtClean="0"/>
               <a:t>‹Nr.›</a:t>
             </a:fld>
-            <a:endParaRPr lang="de-DE"/>
+            <a:endParaRPr lang="de-DE" dirty="0"/>
           </a:p>
         </p:txBody>
       </p:sp>
@@ -666,9 +666,9 @@
           <a:p>
             <a:fld id="{730348EE-7728-47DB-852A-8087B5026653}" type="datetimeFigureOut">
               <a:rPr lang="de-DE" smtClean="0"/>
-              <a:t>30.08.2019</a:t>
+              <a:t>18.09.2019</a:t>
             </a:fld>
-            <a:endParaRPr lang="de-DE"/>
+            <a:endParaRPr lang="de-DE" dirty="0"/>
           </a:p>
         </p:txBody>
       </p:sp>
@@ -693,7 +693,7 @@
           <a:bodyPr/>
           <a:lstStyle/>
           <a:p>
-            <a:endParaRPr lang="de-DE"/>
+            <a:endParaRPr lang="de-DE" dirty="0"/>
           </a:p>
         </p:txBody>
       </p:sp>
@@ -722,7 +722,7 @@
               <a:rPr lang="de-DE" smtClean="0"/>
               <a:t>‹Nr.›</a:t>
             </a:fld>
-            <a:endParaRPr lang="de-DE"/>
+            <a:endParaRPr lang="de-DE" dirty="0"/>
           </a:p>
         </p:txBody>
       </p:sp>
@@ -864,9 +864,9 @@
           <a:p>
             <a:fld id="{730348EE-7728-47DB-852A-8087B5026653}" type="datetimeFigureOut">
               <a:rPr lang="de-DE" smtClean="0"/>
-              <a:t>30.08.2019</a:t>
+              <a:t>18.09.2019</a:t>
             </a:fld>
-            <a:endParaRPr lang="de-DE"/>
+            <a:endParaRPr lang="de-DE" dirty="0"/>
           </a:p>
         </p:txBody>
       </p:sp>
@@ -891,7 +891,7 @@
           <a:bodyPr/>
           <a:lstStyle/>
           <a:p>
-            <a:endParaRPr lang="de-DE"/>
+            <a:endParaRPr lang="de-DE" dirty="0"/>
           </a:p>
         </p:txBody>
       </p:sp>
@@ -920,7 +920,7 @@
               <a:rPr lang="de-DE" smtClean="0"/>
               <a:t>‹Nr.›</a:t>
             </a:fld>
-            <a:endParaRPr lang="de-DE"/>
+            <a:endParaRPr lang="de-DE" dirty="0"/>
           </a:p>
         </p:txBody>
       </p:sp>
@@ -1139,9 +1139,9 @@
           <a:p>
             <a:fld id="{730348EE-7728-47DB-852A-8087B5026653}" type="datetimeFigureOut">
               <a:rPr lang="de-DE" smtClean="0"/>
-              <a:t>30.08.2019</a:t>
+              <a:t>18.09.2019</a:t>
             </a:fld>
-            <a:endParaRPr lang="de-DE"/>
+            <a:endParaRPr lang="de-DE" dirty="0"/>
           </a:p>
         </p:txBody>
       </p:sp>
@@ -1166,7 +1166,7 @@
           <a:bodyPr/>
           <a:lstStyle/>
           <a:p>
-            <a:endParaRPr lang="de-DE"/>
+            <a:endParaRPr lang="de-DE" dirty="0"/>
           </a:p>
         </p:txBody>
       </p:sp>
@@ -1195,7 +1195,7 @@
               <a:rPr lang="de-DE" smtClean="0"/>
               <a:t>‹Nr.›</a:t>
             </a:fld>
-            <a:endParaRPr lang="de-DE"/>
+            <a:endParaRPr lang="de-DE" dirty="0"/>
           </a:p>
         </p:txBody>
       </p:sp>
@@ -1404,9 +1404,9 @@
           <a:p>
             <a:fld id="{730348EE-7728-47DB-852A-8087B5026653}" type="datetimeFigureOut">
               <a:rPr lang="de-DE" smtClean="0"/>
-              <a:t>30.08.2019</a:t>
+              <a:t>18.09.2019</a:t>
             </a:fld>
-            <a:endParaRPr lang="de-DE"/>
+            <a:endParaRPr lang="de-DE" dirty="0"/>
           </a:p>
         </p:txBody>
       </p:sp>
@@ -1431,7 +1431,7 @@
           <a:bodyPr/>
           <a:lstStyle/>
           <a:p>
-            <a:endParaRPr lang="de-DE"/>
+            <a:endParaRPr lang="de-DE" dirty="0"/>
           </a:p>
         </p:txBody>
       </p:sp>
@@ -1460,7 +1460,7 @@
               <a:rPr lang="de-DE" smtClean="0"/>
               <a:t>‹Nr.›</a:t>
             </a:fld>
-            <a:endParaRPr lang="de-DE"/>
+            <a:endParaRPr lang="de-DE" dirty="0"/>
           </a:p>
         </p:txBody>
       </p:sp>
@@ -1816,9 +1816,9 @@
           <a:p>
             <a:fld id="{730348EE-7728-47DB-852A-8087B5026653}" type="datetimeFigureOut">
               <a:rPr lang="de-DE" smtClean="0"/>
-              <a:t>30.08.2019</a:t>
+              <a:t>18.09.2019</a:t>
             </a:fld>
-            <a:endParaRPr lang="de-DE"/>
+            <a:endParaRPr lang="de-DE" dirty="0"/>
           </a:p>
         </p:txBody>
       </p:sp>
@@ -1843,7 +1843,7 @@
           <a:bodyPr/>
           <a:lstStyle/>
           <a:p>
-            <a:endParaRPr lang="de-DE"/>
+            <a:endParaRPr lang="de-DE" dirty="0"/>
           </a:p>
         </p:txBody>
       </p:sp>
@@ -1872,7 +1872,7 @@
               <a:rPr lang="de-DE" smtClean="0"/>
               <a:t>‹Nr.›</a:t>
             </a:fld>
-            <a:endParaRPr lang="de-DE"/>
+            <a:endParaRPr lang="de-DE" dirty="0"/>
           </a:p>
         </p:txBody>
       </p:sp>
@@ -1957,9 +1957,9 @@
           <a:p>
             <a:fld id="{730348EE-7728-47DB-852A-8087B5026653}" type="datetimeFigureOut">
               <a:rPr lang="de-DE" smtClean="0"/>
-              <a:t>30.08.2019</a:t>
+              <a:t>18.09.2019</a:t>
             </a:fld>
-            <a:endParaRPr lang="de-DE"/>
+            <a:endParaRPr lang="de-DE" dirty="0"/>
           </a:p>
         </p:txBody>
       </p:sp>
@@ -1984,7 +1984,7 @@
           <a:bodyPr/>
           <a:lstStyle/>
           <a:p>
-            <a:endParaRPr lang="de-DE"/>
+            <a:endParaRPr lang="de-DE" dirty="0"/>
           </a:p>
         </p:txBody>
       </p:sp>
@@ -2013,7 +2013,7 @@
               <a:rPr lang="de-DE" smtClean="0"/>
               <a:t>‹Nr.›</a:t>
             </a:fld>
-            <a:endParaRPr lang="de-DE"/>
+            <a:endParaRPr lang="de-DE" dirty="0"/>
           </a:p>
         </p:txBody>
       </p:sp>
@@ -2070,9 +2070,9 @@
           <a:p>
             <a:fld id="{730348EE-7728-47DB-852A-8087B5026653}" type="datetimeFigureOut">
               <a:rPr lang="de-DE" smtClean="0"/>
-              <a:t>30.08.2019</a:t>
+              <a:t>18.09.2019</a:t>
             </a:fld>
-            <a:endParaRPr lang="de-DE"/>
+            <a:endParaRPr lang="de-DE" dirty="0"/>
           </a:p>
         </p:txBody>
       </p:sp>
@@ -2097,7 +2097,7 @@
           <a:bodyPr/>
           <a:lstStyle/>
           <a:p>
-            <a:endParaRPr lang="de-DE"/>
+            <a:endParaRPr lang="de-DE" dirty="0"/>
           </a:p>
         </p:txBody>
       </p:sp>
@@ -2126,7 +2126,7 @@
               <a:rPr lang="de-DE" smtClean="0"/>
               <a:t>‹Nr.›</a:t>
             </a:fld>
-            <a:endParaRPr lang="de-DE"/>
+            <a:endParaRPr lang="de-DE" dirty="0"/>
           </a:p>
         </p:txBody>
       </p:sp>
@@ -2381,9 +2381,9 @@
           <a:p>
             <a:fld id="{730348EE-7728-47DB-852A-8087B5026653}" type="datetimeFigureOut">
               <a:rPr lang="de-DE" smtClean="0"/>
-              <a:t>30.08.2019</a:t>
+              <a:t>18.09.2019</a:t>
             </a:fld>
-            <a:endParaRPr lang="de-DE"/>
+            <a:endParaRPr lang="de-DE" dirty="0"/>
           </a:p>
         </p:txBody>
       </p:sp>
@@ -2408,7 +2408,7 @@
           <a:bodyPr/>
           <a:lstStyle/>
           <a:p>
-            <a:endParaRPr lang="de-DE"/>
+            <a:endParaRPr lang="de-DE" dirty="0"/>
           </a:p>
         </p:txBody>
       </p:sp>
@@ -2437,7 +2437,7 @@
               <a:rPr lang="de-DE" smtClean="0"/>
               <a:t>‹Nr.›</a:t>
             </a:fld>
-            <a:endParaRPr lang="de-DE"/>
+            <a:endParaRPr lang="de-DE" dirty="0"/>
           </a:p>
         </p:txBody>
       </p:sp>
@@ -2571,7 +2571,7 @@
             </a:lvl9pPr>
           </a:lstStyle>
           <a:p>
-            <a:endParaRPr lang="de-DE"/>
+            <a:endParaRPr lang="de-DE" dirty="0"/>
           </a:p>
         </p:txBody>
       </p:sp>
@@ -2669,9 +2669,9 @@
           <a:p>
             <a:fld id="{730348EE-7728-47DB-852A-8087B5026653}" type="datetimeFigureOut">
               <a:rPr lang="de-DE" smtClean="0"/>
-              <a:t>30.08.2019</a:t>
+              <a:t>18.09.2019</a:t>
             </a:fld>
-            <a:endParaRPr lang="de-DE"/>
+            <a:endParaRPr lang="de-DE" dirty="0"/>
           </a:p>
         </p:txBody>
       </p:sp>
@@ -2696,7 +2696,7 @@
           <a:bodyPr/>
           <a:lstStyle/>
           <a:p>
-            <a:endParaRPr lang="de-DE"/>
+            <a:endParaRPr lang="de-DE" dirty="0"/>
           </a:p>
         </p:txBody>
       </p:sp>
@@ -2725,7 +2725,7 @@
               <a:rPr lang="de-DE" smtClean="0"/>
               <a:t>‹Nr.›</a:t>
             </a:fld>
-            <a:endParaRPr lang="de-DE"/>
+            <a:endParaRPr lang="de-DE" dirty="0"/>
           </a:p>
         </p:txBody>
       </p:sp>
@@ -2910,9 +2910,9 @@
           <a:p>
             <a:fld id="{730348EE-7728-47DB-852A-8087B5026653}" type="datetimeFigureOut">
               <a:rPr lang="de-DE" smtClean="0"/>
-              <a:t>30.08.2019</a:t>
+              <a:t>18.09.2019</a:t>
             </a:fld>
-            <a:endParaRPr lang="de-DE"/>
+            <a:endParaRPr lang="de-DE" dirty="0"/>
           </a:p>
         </p:txBody>
       </p:sp>
@@ -2955,7 +2955,7 @@
             </a:lvl1pPr>
           </a:lstStyle>
           <a:p>
-            <a:endParaRPr lang="de-DE"/>
+            <a:endParaRPr lang="de-DE" dirty="0"/>
           </a:p>
         </p:txBody>
       </p:sp>
@@ -3002,7 +3002,7 @@
               <a:rPr lang="de-DE" smtClean="0"/>
               <a:t>‹Nr.›</a:t>
             </a:fld>
-            <a:endParaRPr lang="de-DE"/>
+            <a:endParaRPr lang="de-DE" dirty="0"/>
           </a:p>
         </p:txBody>
       </p:sp>
@@ -3373,7 +3373,7 @@
           <a:bodyPr/>
           <a:lstStyle/>
           <a:p>
-            <a:endParaRPr lang="de-DE"/>
+            <a:endParaRPr lang="de-DE" dirty="0"/>
           </a:p>
         </p:txBody>
       </p:sp>
@@ -3421,7 +3421,7 @@
         </p:nvSpPr>
         <p:spPr>
           <a:xfrm>
-            <a:off x="1880075" y="1710064"/>
+            <a:off x="984457" y="2192280"/>
             <a:ext cx="10699335" cy="2308324"/>
           </a:xfrm>
           <a:prstGeom prst="rect">
@@ -3436,147 +3436,335 @@
           <a:lstStyle/>
           <a:p>
             <a:r>
-              <a:rPr lang="de-DE" dirty="0"/>
+              <a:rPr lang="de-DE" dirty="0">
+                <a:solidFill>
+                  <a:srgbClr val="646464"/>
+                </a:solidFill>
+                <a:latin typeface="Consolas" panose="020B0609020204030204" pitchFamily="49" charset="0"/>
+              </a:rPr>
               <a:t>@Test</a:t>
             </a:r>
           </a:p>
           <a:p>
             <a:r>
-              <a:rPr lang="de-DE" dirty="0" err="1"/>
+              <a:rPr lang="en-US" b="1" dirty="0">
+                <a:solidFill>
+                  <a:srgbClr val="7F0055"/>
+                </a:solidFill>
+                <a:latin typeface="Consolas" panose="020B0609020204030204" pitchFamily="49" charset="0"/>
+              </a:rPr>
               <a:t>public</a:t>
             </a:r>
             <a:r>
-              <a:rPr lang="de-DE" dirty="0"/>
+              <a:rPr lang="en-US" b="1" dirty="0">
+                <a:solidFill>
+                  <a:srgbClr val="000000"/>
+                </a:solidFill>
+                <a:latin typeface="Consolas" panose="020B0609020204030204" pitchFamily="49" charset="0"/>
+              </a:rPr>
               <a:t> </a:t>
             </a:r>
             <a:r>
-              <a:rPr lang="de-DE" dirty="0" err="1"/>
+              <a:rPr lang="en-US" b="1" dirty="0">
+                <a:solidFill>
+                  <a:srgbClr val="7F0055"/>
+                </a:solidFill>
+                <a:latin typeface="Consolas" panose="020B0609020204030204" pitchFamily="49" charset="0"/>
+              </a:rPr>
               <a:t>void</a:t>
             </a:r>
             <a:r>
-              <a:rPr lang="de-DE" dirty="0"/>
+              <a:rPr lang="en-US" b="1" dirty="0">
+                <a:solidFill>
+                  <a:srgbClr val="000000"/>
+                </a:solidFill>
+                <a:latin typeface="Consolas" panose="020B0609020204030204" pitchFamily="49" charset="0"/>
+              </a:rPr>
               <a:t> </a:t>
             </a:r>
             <a:r>
-              <a:rPr lang="de-DE" dirty="0" err="1"/>
+              <a:rPr lang="en-US" b="1" noProof="1">
+                <a:solidFill>
+                  <a:srgbClr val="000000"/>
+                </a:solidFill>
+                <a:latin typeface="Consolas" panose="020B0609020204030204" pitchFamily="49" charset="0"/>
+              </a:rPr>
               <a:t>testGetFilledCells</a:t>
             </a:r>
             <a:r>
-              <a:rPr lang="de-DE" dirty="0"/>
+              <a:rPr lang="en-US" b="1" dirty="0">
+                <a:solidFill>
+                  <a:srgbClr val="000000"/>
+                </a:solidFill>
+                <a:latin typeface="Consolas" panose="020B0609020204030204" pitchFamily="49" charset="0"/>
+              </a:rPr>
               <a:t>() </a:t>
             </a:r>
             <a:r>
-              <a:rPr lang="de-DE" dirty="0" err="1"/>
+              <a:rPr lang="en-US" b="1" dirty="0">
+                <a:solidFill>
+                  <a:srgbClr val="7F0055"/>
+                </a:solidFill>
+                <a:latin typeface="Consolas" panose="020B0609020204030204" pitchFamily="49" charset="0"/>
+              </a:rPr>
               <a:t>throws</a:t>
             </a:r>
             <a:r>
-              <a:rPr lang="de-DE" dirty="0"/>
-              <a:t> </a:t>
-            </a:r>
-            <a:r>
-              <a:rPr lang="de-DE" dirty="0" err="1"/>
-              <a:t>Exception</a:t>
-            </a:r>
-            <a:r>
-              <a:rPr lang="de-DE" dirty="0"/>
-              <a:t> {</a:t>
-            </a:r>
-          </a:p>
-          <a:p>
-            <a:r>
-              <a:rPr lang="de-DE" dirty="0" err="1"/>
-              <a:t>Cell</a:t>
-            </a:r>
-            <a:r>
-              <a:rPr lang="de-DE" dirty="0"/>
-              <a:t> cell1 = </a:t>
-            </a:r>
-            <a:r>
-              <a:rPr lang="de-DE" dirty="0" err="1"/>
-              <a:t>cells.get</a:t>
-            </a:r>
-            <a:r>
-              <a:rPr lang="de-DE" dirty="0"/>
-              <a:t>(3);</a:t>
-            </a:r>
-          </a:p>
-          <a:p>
-            <a:r>
-              <a:rPr lang="de-DE" dirty="0" err="1"/>
-              <a:t>Cell</a:t>
-            </a:r>
-            <a:r>
-              <a:rPr lang="de-DE" dirty="0"/>
-              <a:t> cell2 = </a:t>
-            </a:r>
-            <a:r>
-              <a:rPr lang="de-DE" dirty="0" err="1"/>
-              <a:t>cells.get</a:t>
-            </a:r>
-            <a:r>
-              <a:rPr lang="de-DE" dirty="0"/>
-              <a:t>(8);</a:t>
-            </a:r>
-          </a:p>
-          <a:p>
-            <a:r>
-              <a:rPr lang="de-DE" dirty="0"/>
-              <a:t>cell1.placeDigit(</a:t>
-            </a:r>
-            <a:r>
-              <a:rPr lang="de-DE" dirty="0" err="1"/>
-              <a:t>Digit.FIVE</a:t>
-            </a:r>
-            <a:r>
-              <a:rPr lang="de-DE" dirty="0"/>
+              <a:rPr lang="en-US" b="1" dirty="0">
+                <a:solidFill>
+                  <a:srgbClr val="000000"/>
+                </a:solidFill>
+                <a:latin typeface="Consolas" panose="020B0609020204030204" pitchFamily="49" charset="0"/>
+              </a:rPr>
+              <a:t> Exception {</a:t>
+            </a:r>
+          </a:p>
+          <a:p>
+            <a:r>
+              <a:rPr lang="en-US" dirty="0">
+                <a:solidFill>
+                  <a:srgbClr val="000000"/>
+                </a:solidFill>
+                <a:latin typeface="Consolas" panose="020B0609020204030204" pitchFamily="49" charset="0"/>
+              </a:rPr>
+              <a:t>  Cell </a:t>
+            </a:r>
+            <a:r>
+              <a:rPr lang="en-US" dirty="0">
+                <a:solidFill>
+                  <a:srgbClr val="6A3E3E"/>
+                </a:solidFill>
+                <a:latin typeface="Consolas" panose="020B0609020204030204" pitchFamily="49" charset="0"/>
+              </a:rPr>
+              <a:t>cell1</a:t>
+            </a:r>
+            <a:r>
+              <a:rPr lang="en-US" dirty="0">
+                <a:solidFill>
+                  <a:srgbClr val="000000"/>
+                </a:solidFill>
+                <a:latin typeface="Consolas" panose="020B0609020204030204" pitchFamily="49" charset="0"/>
+              </a:rPr>
+              <a:t> = </a:t>
+            </a:r>
+            <a:r>
+              <a:rPr lang="en-US" dirty="0">
+                <a:solidFill>
+                  <a:srgbClr val="0000C0"/>
+                </a:solidFill>
+                <a:latin typeface="Consolas" panose="020B0609020204030204" pitchFamily="49" charset="0"/>
+              </a:rPr>
+              <a:t>cells</a:t>
+            </a:r>
+            <a:r>
+              <a:rPr lang="en-US" dirty="0">
+                <a:solidFill>
+                  <a:srgbClr val="000000"/>
+                </a:solidFill>
+                <a:latin typeface="Consolas" panose="020B0609020204030204" pitchFamily="49" charset="0"/>
+              </a:rPr>
+              <a:t>.get(3);</a:t>
+            </a:r>
+          </a:p>
+          <a:p>
+            <a:r>
+              <a:rPr lang="en-US" dirty="0">
+                <a:solidFill>
+                  <a:srgbClr val="000000"/>
+                </a:solidFill>
+                <a:latin typeface="Consolas" panose="020B0609020204030204" pitchFamily="49" charset="0"/>
+              </a:rPr>
+              <a:t>  Cell </a:t>
+            </a:r>
+            <a:r>
+              <a:rPr lang="en-US" dirty="0">
+                <a:solidFill>
+                  <a:srgbClr val="6A3E3E"/>
+                </a:solidFill>
+                <a:latin typeface="Consolas" panose="020B0609020204030204" pitchFamily="49" charset="0"/>
+              </a:rPr>
+              <a:t>cell2</a:t>
+            </a:r>
+            <a:r>
+              <a:rPr lang="en-US" dirty="0">
+                <a:solidFill>
+                  <a:srgbClr val="000000"/>
+                </a:solidFill>
+                <a:latin typeface="Consolas" panose="020B0609020204030204" pitchFamily="49" charset="0"/>
+              </a:rPr>
+              <a:t> = </a:t>
+            </a:r>
+            <a:r>
+              <a:rPr lang="en-US" dirty="0">
+                <a:solidFill>
+                  <a:srgbClr val="0000C0"/>
+                </a:solidFill>
+                <a:latin typeface="Consolas" panose="020B0609020204030204" pitchFamily="49" charset="0"/>
+              </a:rPr>
+              <a:t>cells</a:t>
+            </a:r>
+            <a:r>
+              <a:rPr lang="en-US" dirty="0">
+                <a:solidFill>
+                  <a:srgbClr val="000000"/>
+                </a:solidFill>
+                <a:latin typeface="Consolas" panose="020B0609020204030204" pitchFamily="49" charset="0"/>
+              </a:rPr>
+              <a:t>.get(8);</a:t>
+            </a:r>
+          </a:p>
+          <a:p>
+            <a:r>
+              <a:rPr lang="de-DE" dirty="0">
+                <a:solidFill>
+                  <a:srgbClr val="6A3E3E"/>
+                </a:solidFill>
+                <a:latin typeface="Consolas" panose="020B0609020204030204" pitchFamily="49" charset="0"/>
+              </a:rPr>
+              <a:t>  cell1</a:t>
+            </a:r>
+            <a:r>
+              <a:rPr lang="de-DE" dirty="0">
+                <a:solidFill>
+                  <a:srgbClr val="000000"/>
+                </a:solidFill>
+                <a:latin typeface="Consolas" panose="020B0609020204030204" pitchFamily="49" charset="0"/>
+              </a:rPr>
+              <a:t>.placeDigit(Digit.</a:t>
+            </a:r>
+            <a:r>
+              <a:rPr lang="de-DE" b="1" i="1" dirty="0">
+                <a:solidFill>
+                  <a:srgbClr val="0000C0"/>
+                </a:solidFill>
+                <a:latin typeface="Consolas" panose="020B0609020204030204" pitchFamily="49" charset="0"/>
+              </a:rPr>
+              <a:t>FIVE</a:t>
+            </a:r>
+            <a:r>
+              <a:rPr lang="de-DE" b="1" i="1" dirty="0">
+                <a:solidFill>
+                  <a:srgbClr val="000000"/>
+                </a:solidFill>
+                <a:latin typeface="Consolas" panose="020B0609020204030204" pitchFamily="49" charset="0"/>
+              </a:rPr>
               <a:t>);</a:t>
             </a:r>
           </a:p>
           <a:p>
             <a:r>
-              <a:rPr lang="de-DE" dirty="0"/>
-              <a:t>cell2.placeDigit(</a:t>
-            </a:r>
-            <a:r>
-              <a:rPr lang="de-DE" dirty="0" err="1"/>
-              <a:t>Digit.FOUR</a:t>
-            </a:r>
-            <a:r>
-              <a:rPr lang="de-DE" dirty="0"/>
+              <a:rPr lang="de-DE" dirty="0">
+                <a:solidFill>
+                  <a:srgbClr val="6A3E3E"/>
+                </a:solidFill>
+                <a:latin typeface="Consolas" panose="020B0609020204030204" pitchFamily="49" charset="0"/>
+              </a:rPr>
+              <a:t>  cell2</a:t>
+            </a:r>
+            <a:r>
+              <a:rPr lang="de-DE" dirty="0">
+                <a:solidFill>
+                  <a:srgbClr val="000000"/>
+                </a:solidFill>
+                <a:latin typeface="Consolas" panose="020B0609020204030204" pitchFamily="49" charset="0"/>
+              </a:rPr>
+              <a:t>.placeDigit(Digit.</a:t>
+            </a:r>
+            <a:r>
+              <a:rPr lang="de-DE" b="1" i="1" dirty="0">
+                <a:solidFill>
+                  <a:srgbClr val="0000C0"/>
+                </a:solidFill>
+                <a:latin typeface="Consolas" panose="020B0609020204030204" pitchFamily="49" charset="0"/>
+              </a:rPr>
+              <a:t>FOUR</a:t>
+            </a:r>
+            <a:r>
+              <a:rPr lang="de-DE" b="1" i="1" dirty="0">
+                <a:solidFill>
+                  <a:srgbClr val="000000"/>
+                </a:solidFill>
+                <a:latin typeface="Consolas" panose="020B0609020204030204" pitchFamily="49" charset="0"/>
+              </a:rPr>
               <a:t>);</a:t>
             </a:r>
           </a:p>
           <a:p>
             <a:r>
-              <a:rPr lang="de-DE" dirty="0" err="1"/>
-              <a:t>assertThat</a:t>
-            </a:r>
-            <a:r>
-              <a:rPr lang="de-DE" dirty="0"/>
-              <a:t>(</a:t>
-            </a:r>
-            <a:r>
-              <a:rPr lang="de-DE" dirty="0" err="1"/>
-              <a:t>house.getFilledCells</a:t>
-            </a:r>
-            <a:r>
-              <a:rPr lang="de-DE" dirty="0"/>
-              <a:t>()).</a:t>
-            </a:r>
-            <a:r>
-              <a:rPr lang="de-DE" dirty="0" err="1"/>
-              <a:t>contains</a:t>
-            </a:r>
-            <a:r>
-              <a:rPr lang="de-DE" dirty="0"/>
-              <a:t>(cell1, cell2);</a:t>
-            </a:r>
-          </a:p>
-          <a:p>
-            <a:r>
-              <a:rPr lang="de-DE" dirty="0"/>
+              <a:rPr lang="en-US" i="1" dirty="0">
+                <a:solidFill>
+                  <a:srgbClr val="000000"/>
+                </a:solidFill>
+                <a:latin typeface="Consolas" panose="020B0609020204030204" pitchFamily="49" charset="0"/>
+              </a:rPr>
+              <a:t>  assertThat(</a:t>
+            </a:r>
+            <a:r>
+              <a:rPr lang="en-US" i="1" dirty="0">
+                <a:solidFill>
+                  <a:srgbClr val="0000C0"/>
+                </a:solidFill>
+                <a:latin typeface="Consolas" panose="020B0609020204030204" pitchFamily="49" charset="0"/>
+              </a:rPr>
+              <a:t>house</a:t>
+            </a:r>
+            <a:r>
+              <a:rPr lang="en-US" i="1" dirty="0">
+                <a:solidFill>
+                  <a:srgbClr val="000000"/>
+                </a:solidFill>
+                <a:latin typeface="Consolas" panose="020B0609020204030204" pitchFamily="49" charset="0"/>
+              </a:rPr>
+              <a:t>.getFilledCells()).contains(</a:t>
+            </a:r>
+            <a:r>
+              <a:rPr lang="en-US" i="1" dirty="0">
+                <a:solidFill>
+                  <a:srgbClr val="6A3E3E"/>
+                </a:solidFill>
+                <a:latin typeface="Consolas" panose="020B0609020204030204" pitchFamily="49" charset="0"/>
+              </a:rPr>
+              <a:t>cell1</a:t>
+            </a:r>
+            <a:r>
+              <a:rPr lang="en-US" i="1" dirty="0">
+                <a:solidFill>
+                  <a:srgbClr val="000000"/>
+                </a:solidFill>
+                <a:latin typeface="Consolas" panose="020B0609020204030204" pitchFamily="49" charset="0"/>
+              </a:rPr>
+              <a:t>, </a:t>
+            </a:r>
+            <a:r>
+              <a:rPr lang="en-US" i="1" dirty="0">
+                <a:solidFill>
+                  <a:srgbClr val="6A3E3E"/>
+                </a:solidFill>
+                <a:latin typeface="Consolas" panose="020B0609020204030204" pitchFamily="49" charset="0"/>
+              </a:rPr>
+              <a:t>cell2</a:t>
+            </a:r>
+            <a:r>
+              <a:rPr lang="en-US" i="1" dirty="0">
+                <a:solidFill>
+                  <a:srgbClr val="000000"/>
+                </a:solidFill>
+                <a:latin typeface="Consolas" panose="020B0609020204030204" pitchFamily="49" charset="0"/>
+              </a:rPr>
+              <a:t>);</a:t>
+            </a:r>
+          </a:p>
+          <a:p>
+            <a:r>
+              <a:rPr lang="de-DE" dirty="0">
+                <a:solidFill>
+                  <a:srgbClr val="000000"/>
+                </a:solidFill>
+                <a:latin typeface="Consolas" panose="020B0609020204030204" pitchFamily="49" charset="0"/>
+              </a:rPr>
               <a:t>}</a:t>
             </a:r>
+            <a:endParaRPr lang="de-DE" dirty="0"/>
           </a:p>
         </p:txBody>
       </p:sp>
@@ -3613,15 +3801,11 @@
               <a:rPr lang="de-DE" sz="5400" b="0" cap="none" spc="0" dirty="0">
                 <a:ln w="0"/>
                 <a:solidFill>
-                  <a:schemeClr val="tx1"/>
-                </a:solidFill>
-                <a:effectLst>
-                  <a:outerShdw blurRad="38100" dist="19050" dir="2700000" algn="tl" rotWithShape="0">
-                    <a:schemeClr val="dk1">
-                      <a:alpha val="40000"/>
-                    </a:schemeClr>
-                  </a:outerShdw>
-                </a:effectLst>
+                  <a:schemeClr val="tx1">
+                    <a:lumMod val="85000"/>
+                    <a:lumOff val="15000"/>
+                  </a:schemeClr>
+                </a:solidFill>
               </a:rPr>
               <a:t>isoliert</a:t>
             </a:r>
@@ -3642,7 +3826,7 @@
         </p:nvSpPr>
         <p:spPr>
           <a:xfrm>
-            <a:off x="7844702" y="2658263"/>
+            <a:off x="8051179" y="2048414"/>
             <a:ext cx="3045834" cy="923330"/>
           </a:xfrm>
           <a:prstGeom prst="rect">
@@ -3661,15 +3845,11 @@
               <a:rPr lang="de-DE" sz="5400" b="0" cap="none" spc="0" dirty="0">
                 <a:ln w="0"/>
                 <a:solidFill>
-                  <a:schemeClr val="tx1"/>
-                </a:solidFill>
-                <a:effectLst>
-                  <a:outerShdw blurRad="38100" dist="19050" dir="2700000" algn="tl" rotWithShape="0">
-                    <a:schemeClr val="dk1">
-                      <a:alpha val="40000"/>
-                    </a:schemeClr>
-                  </a:outerShdw>
-                </a:effectLst>
+                  <a:schemeClr val="tx1">
+                    <a:lumMod val="85000"/>
+                    <a:lumOff val="15000"/>
+                  </a:schemeClr>
+                </a:solidFill>
               </a:rPr>
               <a:t>funktional</a:t>
             </a:r>
@@ -3690,7 +3870,7 @@
         </p:nvSpPr>
         <p:spPr>
           <a:xfrm>
-            <a:off x="8519470" y="4504922"/>
+            <a:off x="9400715" y="3504510"/>
             <a:ext cx="1696298" cy="923330"/>
           </a:xfrm>
           <a:prstGeom prst="rect">
@@ -3709,15 +3889,11 @@
               <a:rPr lang="de-DE" sz="5400" b="0" cap="none" spc="0" dirty="0">
                 <a:ln w="0"/>
                 <a:solidFill>
-                  <a:schemeClr val="tx1"/>
-                </a:solidFill>
-                <a:effectLst>
-                  <a:outerShdw blurRad="38100" dist="19050" dir="2700000" algn="tl" rotWithShape="0">
-                    <a:schemeClr val="dk1">
-                      <a:alpha val="40000"/>
-                    </a:schemeClr>
-                  </a:outerShdw>
-                </a:effectLst>
+                  <a:schemeClr val="tx1">
+                    <a:lumMod val="85000"/>
+                    <a:lumOff val="15000"/>
+                  </a:schemeClr>
+                </a:solidFill>
               </a:rPr>
               <a:t>TDD?</a:t>
             </a:r>
@@ -3757,15 +3933,11 @@
               <a:rPr lang="de-DE" sz="5400" b="0" cap="none" spc="0" dirty="0">
                 <a:ln w="0"/>
                 <a:solidFill>
-                  <a:schemeClr val="tx1"/>
-                </a:solidFill>
-                <a:effectLst>
-                  <a:outerShdw blurRad="38100" dist="19050" dir="2700000" algn="tl" rotWithShape="0">
-                    <a:schemeClr val="dk1">
-                      <a:alpha val="40000"/>
-                    </a:schemeClr>
-                  </a:outerShdw>
-                </a:effectLst>
+                  <a:schemeClr val="tx1">
+                    <a:lumMod val="85000"/>
+                    <a:lumOff val="15000"/>
+                  </a:schemeClr>
+                </a:solidFill>
               </a:rPr>
               <a:t>generiert?</a:t>
             </a:r>
@@ -3786,7 +3958,7 @@
         </p:nvSpPr>
         <p:spPr>
           <a:xfrm>
-            <a:off x="6933516" y="5539485"/>
+            <a:off x="6469784" y="5554209"/>
             <a:ext cx="1734770" cy="923330"/>
           </a:xfrm>
           <a:prstGeom prst="rect">
@@ -3805,15 +3977,11 @@
               <a:rPr lang="de-DE" sz="5400" b="0" cap="none" spc="0" dirty="0">
                 <a:ln w="0"/>
                 <a:solidFill>
-                  <a:schemeClr val="tx1"/>
-                </a:solidFill>
-                <a:effectLst>
-                  <a:outerShdw blurRad="38100" dist="19050" dir="2700000" algn="tl" rotWithShape="0">
-                    <a:schemeClr val="dk1">
-                      <a:alpha val="40000"/>
-                    </a:schemeClr>
-                  </a:outerShdw>
-                </a:effectLst>
+                  <a:schemeClr val="tx1">
+                    <a:lumMod val="85000"/>
+                    <a:lumOff val="15000"/>
+                  </a:schemeClr>
+                </a:solidFill>
               </a:rPr>
               <a:t>BDD?</a:t>
             </a:r>
@@ -3834,7 +4002,7 @@
         </p:nvSpPr>
         <p:spPr>
           <a:xfrm>
-            <a:off x="2046016" y="4504922"/>
+            <a:off x="1245916" y="4630312"/>
             <a:ext cx="5003550" cy="923330"/>
           </a:xfrm>
           <a:prstGeom prst="rect">
@@ -3852,13 +4020,12 @@
             <a:r>
               <a:rPr lang="de-DE" sz="5400" dirty="0">
                 <a:ln w="0"/>
-                <a:effectLst>
-                  <a:outerShdw blurRad="38100" dist="19050" dir="2700000" algn="tl" rotWithShape="0">
-                    <a:schemeClr val="dk1">
-                      <a:alpha val="40000"/>
-                    </a:schemeClr>
-                  </a:outerShdw>
-                </a:effectLst>
+                <a:solidFill>
+                  <a:schemeClr val="tx1">
+                    <a:lumMod val="85000"/>
+                    <a:lumOff val="15000"/>
+                  </a:schemeClr>
+                </a:solidFill>
               </a:rPr>
               <a:t>p</a:t>
             </a:r>
@@ -3866,15 +4033,11 @@
               <a:rPr lang="de-DE" sz="5400" b="0" cap="none" spc="0" dirty="0">
                 <a:ln w="0"/>
                 <a:solidFill>
-                  <a:schemeClr val="tx1"/>
-                </a:solidFill>
-                <a:effectLst>
-                  <a:outerShdw blurRad="38100" dist="19050" dir="2700000" algn="tl" rotWithShape="0">
-                    <a:schemeClr val="dk1">
-                      <a:alpha val="40000"/>
-                    </a:schemeClr>
-                  </a:outerShdw>
-                </a:effectLst>
+                  <a:schemeClr val="tx1">
+                    <a:lumMod val="85000"/>
+                    <a:lumOff val="15000"/>
+                  </a:schemeClr>
+                </a:solidFill>
               </a:rPr>
               <a:t>arametrisieren?</a:t>
             </a:r>
@@ -3895,7 +4058,7 @@
         </p:nvSpPr>
         <p:spPr>
           <a:xfrm>
-            <a:off x="5871934" y="3556723"/>
+            <a:off x="8042907" y="4673555"/>
             <a:ext cx="2715616" cy="923330"/>
           </a:xfrm>
           <a:prstGeom prst="rect">
@@ -3914,15 +4077,11 @@
               <a:rPr lang="de-DE" sz="5400" b="0" cap="none" spc="0" dirty="0">
                 <a:ln w="0"/>
                 <a:solidFill>
-                  <a:schemeClr val="tx1"/>
-                </a:solidFill>
-                <a:effectLst>
-                  <a:outerShdw blurRad="38100" dist="19050" dir="2700000" algn="tl" rotWithShape="0">
-                    <a:schemeClr val="dk1">
-                      <a:alpha val="40000"/>
-                    </a:schemeClr>
-                  </a:outerShdw>
-                </a:effectLst>
+                  <a:schemeClr val="tx1">
+                    <a:lumMod val="85000"/>
+                    <a:lumOff val="15000"/>
+                  </a:schemeClr>
+                </a:solidFill>
               </a:rPr>
               <a:t>zu lasch?</a:t>
             </a:r>

</xml_diff>